<commit_message>
Corrigir slide com o código indentado
</commit_message>
<xml_diff>
--- a/SLIDE Projeto Arduino.pptx
+++ b/SLIDE Projeto Arduino.pptx
@@ -3685,48 +3685,7 @@
       </p:grpSp>
       <p:sp>
         <p:nvSpPr>
-          <p:cNvPr name="TextBox 5" id="5"/>
-          <p:cNvSpPr txBox="true"/>
-          <p:nvPr/>
-        </p:nvSpPr>
-        <p:spPr>
-          <a:xfrm rot="0">
-            <a:off x="16494267" y="1367349"/>
-            <a:ext cx="229691" cy="452561"/>
-          </a:xfrm>
-          <a:prstGeom prst="rect">
-            <a:avLst/>
-          </a:prstGeom>
-        </p:spPr>
-        <p:txBody>
-          <a:bodyPr anchor="t" rtlCol="false" tIns="0" lIns="0" bIns="0" rIns="0">
-            <a:spAutoFit/>
-          </a:bodyPr>
-          <a:lstStyle/>
-          <a:p>
-            <a:pPr algn="r">
-              <a:lnSpc>
-                <a:spcPts val="3365"/>
-              </a:lnSpc>
-            </a:pPr>
-            <a:r>
-              <a:rPr lang="en-US" sz="3399" b="true">
-                <a:solidFill>
-                  <a:srgbClr val="F4F6FC"/>
-                </a:solidFill>
-                <a:latin typeface="Barlow Condensed Medium"/>
-                <a:ea typeface="Barlow Condensed Medium"/>
-                <a:cs typeface="Barlow Condensed Medium"/>
-                <a:sym typeface="Barlow Condensed Medium"/>
-              </a:rPr>
-              <a:t>11</a:t>
-            </a:r>
-          </a:p>
-        </p:txBody>
-      </p:sp>
-      <p:sp>
-        <p:nvSpPr>
-          <p:cNvPr name="Freeform 6" id="6"/>
+          <p:cNvPr name="Freeform 5" id="5"/>
           <p:cNvSpPr/>
           <p:nvPr/>
         </p:nvSpPr>
@@ -3772,48 +3731,7 @@
       </p:sp>
       <p:sp>
         <p:nvSpPr>
-          <p:cNvPr name="TextBox 7" id="7"/>
-          <p:cNvSpPr txBox="true"/>
-          <p:nvPr/>
-        </p:nvSpPr>
-        <p:spPr>
-          <a:xfrm rot="0">
-            <a:off x="1564042" y="1400902"/>
-            <a:ext cx="4605780" cy="419042"/>
-          </a:xfrm>
-          <a:prstGeom prst="rect">
-            <a:avLst/>
-          </a:prstGeom>
-        </p:spPr>
-        <p:txBody>
-          <a:bodyPr anchor="t" rtlCol="false" tIns="0" lIns="0" bIns="0" rIns="0">
-            <a:spAutoFit/>
-          </a:bodyPr>
-          <a:lstStyle/>
-          <a:p>
-            <a:pPr algn="l">
-              <a:lnSpc>
-                <a:spcPts val="3181"/>
-              </a:lnSpc>
-            </a:pPr>
-            <a:r>
-              <a:rPr lang="en-US" sz="3213">
-                <a:solidFill>
-                  <a:srgbClr val="F4F6FC"/>
-                </a:solidFill>
-                <a:latin typeface="Barlow Condensed"/>
-                <a:ea typeface="Barlow Condensed"/>
-                <a:cs typeface="Barlow Condensed"/>
-                <a:sym typeface="Barlow Condensed"/>
-              </a:rPr>
-              <a:t>Circuito do Projeto</a:t>
-            </a:r>
-          </a:p>
-        </p:txBody>
-      </p:sp>
-      <p:sp>
-        <p:nvSpPr>
-          <p:cNvPr name="Freeform 8" id="8"/>
+          <p:cNvPr name="Freeform 6" id="6"/>
           <p:cNvSpPr/>
           <p:nvPr/>
         </p:nvSpPr>
@@ -3862,6 +3780,134 @@
             </a:stretch>
           </a:blipFill>
         </p:spPr>
+      </p:sp>
+      <p:sp>
+        <p:nvSpPr>
+          <p:cNvPr name="Freeform 7" id="7"/>
+          <p:cNvSpPr/>
+          <p:nvPr/>
+        </p:nvSpPr>
+        <p:spPr>
+          <a:xfrm flipH="false" flipV="false" rot="0">
+            <a:off x="1785854" y="2279749"/>
+            <a:ext cx="9351023" cy="5727501"/>
+          </a:xfrm>
+          <a:custGeom>
+            <a:avLst/>
+            <a:gdLst/>
+            <a:ahLst/>
+            <a:cxnLst/>
+            <a:rect r="r" b="b" t="t" l="l"/>
+            <a:pathLst>
+              <a:path h="5727501" w="9351023">
+                <a:moveTo>
+                  <a:pt x="0" y="0"/>
+                </a:moveTo>
+                <a:lnTo>
+                  <a:pt x="9351022" y="0"/>
+                </a:lnTo>
+                <a:lnTo>
+                  <a:pt x="9351022" y="5727502"/>
+                </a:lnTo>
+                <a:lnTo>
+                  <a:pt x="0" y="5727502"/>
+                </a:lnTo>
+                <a:lnTo>
+                  <a:pt x="0" y="0"/>
+                </a:lnTo>
+                <a:close/>
+              </a:path>
+            </a:pathLst>
+          </a:custGeom>
+          <a:blipFill>
+            <a:blip r:embed="rId2"/>
+            <a:stretch>
+              <a:fillRect l="0" t="0" r="0" b="0"/>
+            </a:stretch>
+          </a:blipFill>
+        </p:spPr>
+      </p:sp>
+      <p:sp>
+        <p:nvSpPr>
+          <p:cNvPr name="TextBox 8" id="8"/>
+          <p:cNvSpPr txBox="true"/>
+          <p:nvPr/>
+        </p:nvSpPr>
+        <p:spPr>
+          <a:xfrm rot="0">
+            <a:off x="16494267" y="1367349"/>
+            <a:ext cx="229691" cy="452561"/>
+          </a:xfrm>
+          <a:prstGeom prst="rect">
+            <a:avLst/>
+          </a:prstGeom>
+        </p:spPr>
+        <p:txBody>
+          <a:bodyPr anchor="t" rtlCol="false" tIns="0" lIns="0" bIns="0" rIns="0">
+            <a:spAutoFit/>
+          </a:bodyPr>
+          <a:lstStyle/>
+          <a:p>
+            <a:pPr algn="r">
+              <a:lnSpc>
+                <a:spcPts val="3365"/>
+              </a:lnSpc>
+            </a:pPr>
+            <a:r>
+              <a:rPr lang="en-US" sz="3399" b="true">
+                <a:solidFill>
+                  <a:srgbClr val="F4F6FC"/>
+                </a:solidFill>
+                <a:latin typeface="Barlow Condensed Medium"/>
+                <a:ea typeface="Barlow Condensed Medium"/>
+                <a:cs typeface="Barlow Condensed Medium"/>
+                <a:sym typeface="Barlow Condensed Medium"/>
+              </a:rPr>
+              <a:t>11</a:t>
+            </a:r>
+          </a:p>
+        </p:txBody>
+      </p:sp>
+      <p:sp>
+        <p:nvSpPr>
+          <p:cNvPr name="TextBox 9" id="9"/>
+          <p:cNvSpPr txBox="true"/>
+          <p:nvPr/>
+        </p:nvSpPr>
+        <p:spPr>
+          <a:xfrm rot="0">
+            <a:off x="1564042" y="1400902"/>
+            <a:ext cx="4605780" cy="419042"/>
+          </a:xfrm>
+          <a:prstGeom prst="rect">
+            <a:avLst/>
+          </a:prstGeom>
+        </p:spPr>
+        <p:txBody>
+          <a:bodyPr anchor="t" rtlCol="false" tIns="0" lIns="0" bIns="0" rIns="0">
+            <a:spAutoFit/>
+          </a:bodyPr>
+          <a:lstStyle/>
+          <a:p>
+            <a:pPr algn="l">
+              <a:lnSpc>
+                <a:spcPts val="3181"/>
+              </a:lnSpc>
+            </a:pPr>
+            <a:r>
+              <a:rPr lang="en-US" sz="3213">
+                <a:solidFill>
+                  <a:srgbClr val="F4F6FC"/>
+                </a:solidFill>
+                <a:latin typeface="Barlow Condensed"/>
+                <a:ea typeface="Barlow Condensed"/>
+                <a:cs typeface="Barlow Condensed"/>
+                <a:sym typeface="Barlow Condensed"/>
+              </a:rPr>
+              <a:t>Circuito do Projeto</a:t>
+            </a:r>
+          </a:p>
+        </p:txBody>
       </p:sp>
     </p:spTree>
   </p:cSld>
@@ -8254,30 +8300,123 @@
           </a:blipFill>
         </p:spPr>
       </p:sp>
+      <p:sp>
+        <p:nvSpPr>
+          <p:cNvPr name="TextBox 6" id="6"/>
+          <p:cNvSpPr txBox="true"/>
+          <p:nvPr/>
+        </p:nvSpPr>
+        <p:spPr>
+          <a:xfrm rot="0">
+            <a:off x="16416049" y="1367349"/>
+            <a:ext cx="307909" cy="452561"/>
+          </a:xfrm>
+          <a:prstGeom prst="rect">
+            <a:avLst/>
+          </a:prstGeom>
+        </p:spPr>
+        <p:txBody>
+          <a:bodyPr anchor="t" rtlCol="false" tIns="0" lIns="0" bIns="0" rIns="0">
+            <a:spAutoFit/>
+          </a:bodyPr>
+          <a:lstStyle/>
+          <a:p>
+            <a:pPr algn="r">
+              <a:lnSpc>
+                <a:spcPts val="3365"/>
+              </a:lnSpc>
+            </a:pPr>
+            <a:r>
+              <a:rPr lang="en-US" sz="3399" b="true">
+                <a:solidFill>
+                  <a:srgbClr val="F4F6FC"/>
+                </a:solidFill>
+                <a:latin typeface="Barlow Condensed Medium"/>
+                <a:ea typeface="Barlow Condensed Medium"/>
+                <a:cs typeface="Barlow Condensed Medium"/>
+                <a:sym typeface="Barlow Condensed Medium"/>
+              </a:rPr>
+              <a:t>10</a:t>
+            </a:r>
+          </a:p>
+        </p:txBody>
+      </p:sp>
+      <p:sp>
+        <p:nvSpPr>
+          <p:cNvPr name="Freeform 7" id="7"/>
+          <p:cNvSpPr/>
+          <p:nvPr/>
+        </p:nvSpPr>
+        <p:spPr>
+          <a:xfrm flipH="false" flipV="true" rot="0">
+            <a:off x="15567880" y="-1028700"/>
+            <a:ext cx="5440240" cy="4114800"/>
+          </a:xfrm>
+          <a:custGeom>
+            <a:avLst/>
+            <a:gdLst/>
+            <a:ahLst/>
+            <a:cxnLst/>
+            <a:rect r="r" b="b" t="t" l="l"/>
+            <a:pathLst>
+              <a:path h="4114800" w="5440240">
+                <a:moveTo>
+                  <a:pt x="0" y="4114800"/>
+                </a:moveTo>
+                <a:lnTo>
+                  <a:pt x="5440240" y="4114800"/>
+                </a:lnTo>
+                <a:lnTo>
+                  <a:pt x="5440240" y="0"/>
+                </a:lnTo>
+                <a:lnTo>
+                  <a:pt x="0" y="0"/>
+                </a:lnTo>
+                <a:lnTo>
+                  <a:pt x="0" y="4114800"/>
+                </a:lnTo>
+                <a:close/>
+              </a:path>
+            </a:pathLst>
+          </a:custGeom>
+          <a:blipFill>
+            <a:blip r:embed="rId4">
+              <a:extLst>
+                <a:ext uri="{96DAC541-7B7A-43D3-8B79-37D633B846F1}">
+                  <asvg:svgBlip xmlns:asvg="http://schemas.microsoft.com/office/drawing/2016/SVG/main" r:embed="rId5"/>
+                </a:ext>
+              </a:extLst>
+            </a:blip>
+            <a:stretch>
+              <a:fillRect l="0" t="0" r="0" b="0"/>
+            </a:stretch>
+          </a:blipFill>
+        </p:spPr>
+      </p:sp>
       <p:grpSp>
         <p:nvGrpSpPr>
-          <p:cNvPr name="Group 6" id="6"/>
+          <p:cNvPr name="Group 8" id="8"/>
           <p:cNvGrpSpPr/>
           <p:nvPr/>
         </p:nvGrpSpPr>
         <p:grpSpPr>
           <a:xfrm rot="0">
-            <a:off x="2096291" y="2762671"/>
-            <a:ext cx="14095419" cy="6658138"/>
+            <a:off x="2015522" y="2600162"/>
+            <a:ext cx="14256955" cy="6658138"/>
             <a:chOff x="0" y="0"/>
-            <a:chExt cx="18793892" cy="8877517"/>
+            <a:chExt cx="19009274" cy="8877517"/>
           </a:xfrm>
         </p:grpSpPr>
         <p:sp>
           <p:nvSpPr>
-            <p:cNvPr name="Freeform 7" id="7"/>
+            <p:cNvPr name="Freeform 9" id="9"/>
             <p:cNvSpPr/>
             <p:nvPr/>
           </p:nvSpPr>
           <p:spPr>
             <a:xfrm flipH="false" flipV="false" rot="0">
               <a:off x="0" y="0"/>
-              <a:ext cx="9633050" cy="8877517"/>
+              <a:ext cx="9557248" cy="8877517"/>
             </a:xfrm>
             <a:custGeom>
               <a:avLst/>
@@ -8286,15 +8425,15 @@
               <a:cxnLst/>
               <a:rect r="r" b="b" t="t" l="l"/>
               <a:pathLst>
-                <a:path h="8877517" w="9633050">
+                <a:path h="8877517" w="9557248">
                   <a:moveTo>
                     <a:pt x="0" y="0"/>
                   </a:moveTo>
                   <a:lnTo>
-                    <a:pt x="9633050" y="0"/>
+                    <a:pt x="9557248" y="0"/>
                   </a:lnTo>
                   <a:lnTo>
-                    <a:pt x="9633050" y="8877517"/>
+                    <a:pt x="9557248" y="8877517"/>
                   </a:lnTo>
                   <a:lnTo>
                     <a:pt x="0" y="8877517"/>
@@ -8307,23 +8446,23 @@
               </a:pathLst>
             </a:custGeom>
             <a:blipFill>
-              <a:blip r:embed="rId4"/>
+              <a:blip r:embed="rId6"/>
               <a:stretch>
-                <a:fillRect l="0" t="0" r="0" b="0"/>
+                <a:fillRect l="0" t="0" r="-13663" b="0"/>
               </a:stretch>
             </a:blipFill>
           </p:spPr>
         </p:sp>
         <p:sp>
           <p:nvSpPr>
-            <p:cNvPr name="Freeform 8" id="8"/>
+            <p:cNvPr name="Freeform 10" id="10"/>
             <p:cNvSpPr/>
             <p:nvPr/>
           </p:nvSpPr>
           <p:spPr>
             <a:xfrm flipH="false" flipV="false" rot="0">
-              <a:off x="9633050" y="0"/>
-              <a:ext cx="9160842" cy="8877517"/>
+              <a:off x="9351975" y="0"/>
+              <a:ext cx="9657299" cy="8877517"/>
             </a:xfrm>
             <a:custGeom>
               <a:avLst/>
@@ -8332,15 +8471,15 @@
               <a:cxnLst/>
               <a:rect r="r" b="b" t="t" l="l"/>
               <a:pathLst>
-                <a:path h="8877517" w="9160842">
+                <a:path h="8877517" w="9657299">
                   <a:moveTo>
                     <a:pt x="0" y="0"/>
                   </a:moveTo>
                   <a:lnTo>
-                    <a:pt x="9160842" y="0"/>
+                    <a:pt x="9657299" y="0"/>
                   </a:lnTo>
                   <a:lnTo>
-                    <a:pt x="9160842" y="8877517"/>
+                    <a:pt x="9657299" y="8877517"/>
                   </a:lnTo>
                   <a:lnTo>
                     <a:pt x="0" y="8877517"/>
@@ -8353,7 +8492,7 @@
               </a:pathLst>
             </a:custGeom>
             <a:blipFill>
-              <a:blip r:embed="rId5"/>
+              <a:blip r:embed="rId7"/>
               <a:stretch>
                 <a:fillRect l="0" t="0" r="0" b="0"/>
               </a:stretch>
@@ -8361,9 +8500,91 @@
           </p:spPr>
         </p:sp>
       </p:grpSp>
-      <p:sp>
-        <p:nvSpPr>
-          <p:cNvPr name="TextBox 9" id="9"/>
+      <p:grpSp>
+        <p:nvGrpSpPr>
+          <p:cNvPr name="Group 11" id="11"/>
+          <p:cNvGrpSpPr/>
+          <p:nvPr/>
+        </p:nvGrpSpPr>
+        <p:grpSpPr>
+          <a:xfrm rot="0">
+            <a:off x="2690336" y="2926138"/>
+            <a:ext cx="3222949" cy="117533"/>
+            <a:chOff x="0" y="0"/>
+            <a:chExt cx="848842" cy="30955"/>
+          </a:xfrm>
+        </p:grpSpPr>
+        <p:sp>
+          <p:nvSpPr>
+            <p:cNvPr name="Freeform 12" id="12"/>
+            <p:cNvSpPr/>
+            <p:nvPr/>
+          </p:nvSpPr>
+          <p:spPr>
+            <a:xfrm flipH="false" flipV="false" rot="0">
+              <a:off x="0" y="0"/>
+              <a:ext cx="848842" cy="30955"/>
+            </a:xfrm>
+            <a:custGeom>
+              <a:avLst/>
+              <a:gdLst/>
+              <a:ahLst/>
+              <a:cxnLst/>
+              <a:rect r="r" b="b" t="t" l="l"/>
+              <a:pathLst>
+                <a:path h="30955" w="848842">
+                  <a:moveTo>
+                    <a:pt x="0" y="0"/>
+                  </a:moveTo>
+                  <a:lnTo>
+                    <a:pt x="848842" y="0"/>
+                  </a:lnTo>
+                  <a:lnTo>
+                    <a:pt x="848842" y="30955"/>
+                  </a:lnTo>
+                  <a:lnTo>
+                    <a:pt x="0" y="30955"/>
+                  </a:lnTo>
+                  <a:close/>
+                </a:path>
+              </a:pathLst>
+            </a:custGeom>
+            <a:solidFill>
+              <a:srgbClr val="1F1F1F"/>
+            </a:solidFill>
+          </p:spPr>
+        </p:sp>
+        <p:sp>
+          <p:nvSpPr>
+            <p:cNvPr name="TextBox 13" id="13"/>
+            <p:cNvSpPr txBox="true"/>
+            <p:nvPr/>
+          </p:nvSpPr>
+          <p:spPr>
+            <a:xfrm>
+              <a:off x="0" y="-47625"/>
+              <a:ext cx="848842" cy="78580"/>
+            </a:xfrm>
+            <a:prstGeom prst="rect">
+              <a:avLst/>
+            </a:prstGeom>
+          </p:spPr>
+          <p:txBody>
+            <a:bodyPr anchor="ctr" rtlCol="false" tIns="50800" lIns="50800" bIns="50800" rIns="50800"/>
+            <a:lstStyle/>
+            <a:p>
+              <a:pPr algn="ctr">
+                <a:lnSpc>
+                  <a:spcPts val="3359"/>
+                </a:lnSpc>
+              </a:pPr>
+            </a:p>
+          </p:txBody>
+        </p:sp>
+      </p:grpSp>
+      <p:sp>
+        <p:nvSpPr>
+          <p:cNvPr name="TextBox 14" id="14"/>
           <p:cNvSpPr txBox="true"/>
           <p:nvPr/>
         </p:nvSpPr>
@@ -8401,99 +8622,6 @@
             </a:r>
           </a:p>
         </p:txBody>
-      </p:sp>
-      <p:sp>
-        <p:nvSpPr>
-          <p:cNvPr name="TextBox 10" id="10"/>
-          <p:cNvSpPr txBox="true"/>
-          <p:nvPr/>
-        </p:nvSpPr>
-        <p:spPr>
-          <a:xfrm rot="0">
-            <a:off x="16416049" y="1367349"/>
-            <a:ext cx="307909" cy="452561"/>
-          </a:xfrm>
-          <a:prstGeom prst="rect">
-            <a:avLst/>
-          </a:prstGeom>
-        </p:spPr>
-        <p:txBody>
-          <a:bodyPr anchor="t" rtlCol="false" tIns="0" lIns="0" bIns="0" rIns="0">
-            <a:spAutoFit/>
-          </a:bodyPr>
-          <a:lstStyle/>
-          <a:p>
-            <a:pPr algn="r">
-              <a:lnSpc>
-                <a:spcPts val="3365"/>
-              </a:lnSpc>
-            </a:pPr>
-            <a:r>
-              <a:rPr lang="en-US" sz="3399" b="true">
-                <a:solidFill>
-                  <a:srgbClr val="F4F6FC"/>
-                </a:solidFill>
-                <a:latin typeface="Barlow Condensed Medium"/>
-                <a:ea typeface="Barlow Condensed Medium"/>
-                <a:cs typeface="Barlow Condensed Medium"/>
-                <a:sym typeface="Barlow Condensed Medium"/>
-              </a:rPr>
-              <a:t>10</a:t>
-            </a:r>
-          </a:p>
-        </p:txBody>
-      </p:sp>
-      <p:sp>
-        <p:nvSpPr>
-          <p:cNvPr name="Freeform 11" id="11"/>
-          <p:cNvSpPr/>
-          <p:nvPr/>
-        </p:nvSpPr>
-        <p:spPr>
-          <a:xfrm flipH="false" flipV="true" rot="0">
-            <a:off x="15567880" y="-1028700"/>
-            <a:ext cx="5440240" cy="4114800"/>
-          </a:xfrm>
-          <a:custGeom>
-            <a:avLst/>
-            <a:gdLst/>
-            <a:ahLst/>
-            <a:cxnLst/>
-            <a:rect r="r" b="b" t="t" l="l"/>
-            <a:pathLst>
-              <a:path h="4114800" w="5440240">
-                <a:moveTo>
-                  <a:pt x="0" y="4114800"/>
-                </a:moveTo>
-                <a:lnTo>
-                  <a:pt x="5440240" y="4114800"/>
-                </a:lnTo>
-                <a:lnTo>
-                  <a:pt x="5440240" y="0"/>
-                </a:lnTo>
-                <a:lnTo>
-                  <a:pt x="0" y="0"/>
-                </a:lnTo>
-                <a:lnTo>
-                  <a:pt x="0" y="4114800"/>
-                </a:lnTo>
-                <a:close/>
-              </a:path>
-            </a:pathLst>
-          </a:custGeom>
-          <a:blipFill>
-            <a:blip r:embed="rId6">
-              <a:extLst>
-                <a:ext uri="{96DAC541-7B7A-43D3-8B79-37D633B846F1}">
-                  <asvg:svgBlip xmlns:asvg="http://schemas.microsoft.com/office/drawing/2016/SVG/main" r:embed="rId7"/>
-                </a:ext>
-              </a:extLst>
-            </a:blip>
-            <a:stretch>
-              <a:fillRect l="0" t="0" r="0" b="0"/>
-            </a:stretch>
-          </a:blipFill>
-        </p:spPr>
       </p:sp>
     </p:spTree>
   </p:cSld>

</xml_diff>

<commit_message>
Alterar ordem dos slides de circuito e codigo
</commit_message>
<xml_diff>
--- a/SLIDE Projeto Arduino.pptx
+++ b/SLIDE Projeto Arduino.pptx
@@ -3691,8 +3691,8 @@
         </p:nvSpPr>
         <p:spPr>
           <a:xfrm flipH="false" flipV="false" rot="0">
-            <a:off x="4105469" y="3086100"/>
-            <a:ext cx="10077061" cy="6172200"/>
+            <a:off x="-2123773" y="9258300"/>
+            <a:ext cx="4099837" cy="4114800"/>
           </a:xfrm>
           <a:custGeom>
             <a:avLst/>
@@ -3701,18 +3701,18 @@
             <a:cxnLst/>
             <a:rect r="r" b="b" t="t" l="l"/>
             <a:pathLst>
-              <a:path h="6172200" w="10077061">
+              <a:path h="4114800" w="4099837">
                 <a:moveTo>
                   <a:pt x="0" y="0"/>
                 </a:moveTo>
                 <a:lnTo>
-                  <a:pt x="10077062" y="0"/>
-                </a:lnTo>
-                <a:lnTo>
-                  <a:pt x="10077062" y="6172200"/>
-                </a:lnTo>
-                <a:lnTo>
-                  <a:pt x="0" y="6172200"/>
+                  <a:pt x="4099837" y="0"/>
+                </a:lnTo>
+                <a:lnTo>
+                  <a:pt x="4099837" y="4114800"/>
+                </a:lnTo>
+                <a:lnTo>
+                  <a:pt x="0" y="4114800"/>
                 </a:lnTo>
                 <a:lnTo>
                   <a:pt x="0" y="0"/>
@@ -3722,7 +3722,13 @@
             </a:pathLst>
           </a:custGeom>
           <a:blipFill>
-            <a:blip r:embed="rId2"/>
+            <a:blip r:embed="rId2">
+              <a:extLst>
+                <a:ext uri="{96DAC541-7B7A-43D3-8B79-37D633B846F1}">
+                  <asvg:svgBlip xmlns:asvg="http://schemas.microsoft.com/office/drawing/2016/SVG/main" r:embed="rId3"/>
+                </a:ext>
+              </a:extLst>
+            </a:blip>
             <a:stretch>
               <a:fillRect l="0" t="0" r="0" b="0"/>
             </a:stretch>
@@ -3736,8 +3742,8 @@
           <p:nvPr/>
         </p:nvSpPr>
         <p:spPr>
-          <a:xfrm flipH="true" flipV="false" rot="0">
-            <a:off x="-2478790" y="6978618"/>
+          <a:xfrm flipH="false" flipV="true" rot="0">
+            <a:off x="15567880" y="-1028700"/>
             <a:ext cx="5440240" cy="4114800"/>
           </a:xfrm>
           <a:custGeom>
@@ -3749,29 +3755,29 @@
             <a:pathLst>
               <a:path h="4114800" w="5440240">
                 <a:moveTo>
+                  <a:pt x="0" y="4114800"/>
+                </a:moveTo>
+                <a:lnTo>
+                  <a:pt x="5440240" y="4114800"/>
+                </a:lnTo>
+                <a:lnTo>
                   <a:pt x="5440240" y="0"/>
-                </a:moveTo>
+                </a:lnTo>
                 <a:lnTo>
                   <a:pt x="0" y="0"/>
                 </a:lnTo>
                 <a:lnTo>
                   <a:pt x="0" y="4114800"/>
-                </a:lnTo>
-                <a:lnTo>
-                  <a:pt x="5440240" y="4114800"/>
-                </a:lnTo>
-                <a:lnTo>
-                  <a:pt x="5440240" y="0"/>
                 </a:lnTo>
                 <a:close/>
               </a:path>
             </a:pathLst>
           </a:custGeom>
           <a:blipFill>
-            <a:blip r:embed="rId3">
+            <a:blip r:embed="rId4">
               <a:extLst>
                 <a:ext uri="{96DAC541-7B7A-43D3-8B79-37D633B846F1}">
-                  <asvg:svgBlip xmlns:asvg="http://schemas.microsoft.com/office/drawing/2016/SVG/main" r:embed="rId4"/>
+                  <asvg:svgBlip xmlns:asvg="http://schemas.microsoft.com/office/drawing/2016/SVG/main" r:embed="rId5"/>
                 </a:ext>
               </a:extLst>
             </a:blip>
@@ -3783,60 +3789,14 @@
       </p:sp>
       <p:sp>
         <p:nvSpPr>
-          <p:cNvPr name="Freeform 7" id="7"/>
-          <p:cNvSpPr/>
-          <p:nvPr/>
-        </p:nvSpPr>
-        <p:spPr>
-          <a:xfrm flipH="false" flipV="false" rot="0">
-            <a:off x="1785854" y="2279749"/>
-            <a:ext cx="9351023" cy="5727501"/>
-          </a:xfrm>
-          <a:custGeom>
-            <a:avLst/>
-            <a:gdLst/>
-            <a:ahLst/>
-            <a:cxnLst/>
-            <a:rect r="r" b="b" t="t" l="l"/>
-            <a:pathLst>
-              <a:path h="5727501" w="9351023">
-                <a:moveTo>
-                  <a:pt x="0" y="0"/>
-                </a:moveTo>
-                <a:lnTo>
-                  <a:pt x="9351022" y="0"/>
-                </a:lnTo>
-                <a:lnTo>
-                  <a:pt x="9351022" y="5727502"/>
-                </a:lnTo>
-                <a:lnTo>
-                  <a:pt x="0" y="5727502"/>
-                </a:lnTo>
-                <a:lnTo>
-                  <a:pt x="0" y="0"/>
-                </a:lnTo>
-                <a:close/>
-              </a:path>
-            </a:pathLst>
-          </a:custGeom>
-          <a:blipFill>
-            <a:blip r:embed="rId2"/>
-            <a:stretch>
-              <a:fillRect l="0" t="0" r="0" b="0"/>
-            </a:stretch>
-          </a:blipFill>
-        </p:spPr>
-      </p:sp>
-      <p:sp>
-        <p:nvSpPr>
-          <p:cNvPr name="TextBox 8" id="8"/>
+          <p:cNvPr name="TextBox 7" id="7"/>
           <p:cNvSpPr txBox="true"/>
           <p:nvPr/>
         </p:nvSpPr>
         <p:spPr>
           <a:xfrm rot="0">
-            <a:off x="16494267" y="1367349"/>
-            <a:ext cx="229691" cy="452561"/>
+            <a:off x="16416049" y="1367349"/>
+            <a:ext cx="307909" cy="452561"/>
           </a:xfrm>
           <a:prstGeom prst="rect">
             <a:avLst/>
@@ -3863,14 +3823,203 @@
                 <a:cs typeface="Barlow Condensed Medium"/>
                 <a:sym typeface="Barlow Condensed Medium"/>
               </a:rPr>
-              <a:t>11</a:t>
-            </a:r>
-          </a:p>
-        </p:txBody>
-      </p:sp>
-      <p:sp>
-        <p:nvSpPr>
-          <p:cNvPr name="TextBox 9" id="9"/>
+              <a:t>10</a:t>
+            </a:r>
+          </a:p>
+        </p:txBody>
+      </p:sp>
+      <p:grpSp>
+        <p:nvGrpSpPr>
+          <p:cNvPr name="Group 8" id="8"/>
+          <p:cNvGrpSpPr/>
+          <p:nvPr/>
+        </p:nvGrpSpPr>
+        <p:grpSpPr>
+          <a:xfrm rot="0">
+            <a:off x="2015522" y="2600162"/>
+            <a:ext cx="14256955" cy="6658138"/>
+            <a:chOff x="0" y="0"/>
+            <a:chExt cx="19009274" cy="8877517"/>
+          </a:xfrm>
+        </p:grpSpPr>
+        <p:sp>
+          <p:nvSpPr>
+            <p:cNvPr name="Freeform 9" id="9"/>
+            <p:cNvSpPr/>
+            <p:nvPr/>
+          </p:nvSpPr>
+          <p:spPr>
+            <a:xfrm flipH="false" flipV="false" rot="0">
+              <a:off x="0" y="0"/>
+              <a:ext cx="9557248" cy="8877517"/>
+            </a:xfrm>
+            <a:custGeom>
+              <a:avLst/>
+              <a:gdLst/>
+              <a:ahLst/>
+              <a:cxnLst/>
+              <a:rect r="r" b="b" t="t" l="l"/>
+              <a:pathLst>
+                <a:path h="8877517" w="9557248">
+                  <a:moveTo>
+                    <a:pt x="0" y="0"/>
+                  </a:moveTo>
+                  <a:lnTo>
+                    <a:pt x="9557248" y="0"/>
+                  </a:lnTo>
+                  <a:lnTo>
+                    <a:pt x="9557248" y="8877517"/>
+                  </a:lnTo>
+                  <a:lnTo>
+                    <a:pt x="0" y="8877517"/>
+                  </a:lnTo>
+                  <a:lnTo>
+                    <a:pt x="0" y="0"/>
+                  </a:lnTo>
+                  <a:close/>
+                </a:path>
+              </a:pathLst>
+            </a:custGeom>
+            <a:blipFill>
+              <a:blip r:embed="rId6"/>
+              <a:stretch>
+                <a:fillRect l="0" t="0" r="-13663" b="0"/>
+              </a:stretch>
+            </a:blipFill>
+          </p:spPr>
+        </p:sp>
+        <p:sp>
+          <p:nvSpPr>
+            <p:cNvPr name="Freeform 10" id="10"/>
+            <p:cNvSpPr/>
+            <p:nvPr/>
+          </p:nvSpPr>
+          <p:spPr>
+            <a:xfrm flipH="false" flipV="false" rot="0">
+              <a:off x="9351975" y="0"/>
+              <a:ext cx="9657299" cy="8877517"/>
+            </a:xfrm>
+            <a:custGeom>
+              <a:avLst/>
+              <a:gdLst/>
+              <a:ahLst/>
+              <a:cxnLst/>
+              <a:rect r="r" b="b" t="t" l="l"/>
+              <a:pathLst>
+                <a:path h="8877517" w="9657299">
+                  <a:moveTo>
+                    <a:pt x="0" y="0"/>
+                  </a:moveTo>
+                  <a:lnTo>
+                    <a:pt x="9657299" y="0"/>
+                  </a:lnTo>
+                  <a:lnTo>
+                    <a:pt x="9657299" y="8877517"/>
+                  </a:lnTo>
+                  <a:lnTo>
+                    <a:pt x="0" y="8877517"/>
+                  </a:lnTo>
+                  <a:lnTo>
+                    <a:pt x="0" y="0"/>
+                  </a:lnTo>
+                  <a:close/>
+                </a:path>
+              </a:pathLst>
+            </a:custGeom>
+            <a:blipFill>
+              <a:blip r:embed="rId7"/>
+              <a:stretch>
+                <a:fillRect l="0" t="0" r="0" b="0"/>
+              </a:stretch>
+            </a:blipFill>
+          </p:spPr>
+        </p:sp>
+      </p:grpSp>
+      <p:grpSp>
+        <p:nvGrpSpPr>
+          <p:cNvPr name="Group 11" id="11"/>
+          <p:cNvGrpSpPr/>
+          <p:nvPr/>
+        </p:nvGrpSpPr>
+        <p:grpSpPr>
+          <a:xfrm rot="0">
+            <a:off x="2690336" y="2926138"/>
+            <a:ext cx="3222949" cy="117533"/>
+            <a:chOff x="0" y="0"/>
+            <a:chExt cx="848842" cy="30955"/>
+          </a:xfrm>
+        </p:grpSpPr>
+        <p:sp>
+          <p:nvSpPr>
+            <p:cNvPr name="Freeform 12" id="12"/>
+            <p:cNvSpPr/>
+            <p:nvPr/>
+          </p:nvSpPr>
+          <p:spPr>
+            <a:xfrm flipH="false" flipV="false" rot="0">
+              <a:off x="0" y="0"/>
+              <a:ext cx="848842" cy="30955"/>
+            </a:xfrm>
+            <a:custGeom>
+              <a:avLst/>
+              <a:gdLst/>
+              <a:ahLst/>
+              <a:cxnLst/>
+              <a:rect r="r" b="b" t="t" l="l"/>
+              <a:pathLst>
+                <a:path h="30955" w="848842">
+                  <a:moveTo>
+                    <a:pt x="0" y="0"/>
+                  </a:moveTo>
+                  <a:lnTo>
+                    <a:pt x="848842" y="0"/>
+                  </a:lnTo>
+                  <a:lnTo>
+                    <a:pt x="848842" y="30955"/>
+                  </a:lnTo>
+                  <a:lnTo>
+                    <a:pt x="0" y="30955"/>
+                  </a:lnTo>
+                  <a:close/>
+                </a:path>
+              </a:pathLst>
+            </a:custGeom>
+            <a:solidFill>
+              <a:srgbClr val="1F1F1F"/>
+            </a:solidFill>
+          </p:spPr>
+        </p:sp>
+        <p:sp>
+          <p:nvSpPr>
+            <p:cNvPr name="TextBox 13" id="13"/>
+            <p:cNvSpPr txBox="true"/>
+            <p:nvPr/>
+          </p:nvSpPr>
+          <p:spPr>
+            <a:xfrm>
+              <a:off x="0" y="-47625"/>
+              <a:ext cx="848842" cy="78580"/>
+            </a:xfrm>
+            <a:prstGeom prst="rect">
+              <a:avLst/>
+            </a:prstGeom>
+          </p:spPr>
+          <p:txBody>
+            <a:bodyPr anchor="ctr" rtlCol="false" tIns="50800" lIns="50800" bIns="50800" rIns="50800"/>
+            <a:lstStyle/>
+            <a:p>
+              <a:pPr algn="ctr">
+                <a:lnSpc>
+                  <a:spcPts val="3359"/>
+                </a:lnSpc>
+              </a:pPr>
+            </a:p>
+          </p:txBody>
+        </p:sp>
+      </p:grpSp>
+      <p:sp>
+        <p:nvSpPr>
+          <p:cNvPr name="TextBox 14" id="14"/>
           <p:cNvSpPr txBox="true"/>
           <p:nvPr/>
         </p:nvSpPr>
@@ -3904,7 +4053,7 @@
                 <a:cs typeface="Barlow Condensed"/>
                 <a:sym typeface="Barlow Condensed"/>
               </a:rPr>
-              <a:t>Circuito do Projeto</a:t>
+              <a:t>Código Utilizado</a:t>
             </a:r>
           </a:p>
         </p:txBody>
@@ -7423,8 +7572,8 @@
         </p:nvSpPr>
         <p:spPr>
           <a:xfrm rot="0">
-            <a:off x="16345769" y="1367349"/>
-            <a:ext cx="378189" cy="452561"/>
+            <a:off x="16366440" y="1367349"/>
+            <a:ext cx="357518" cy="452561"/>
           </a:xfrm>
           <a:prstGeom prst="rect">
             <a:avLst/>
@@ -7451,7 +7600,7 @@
                 <a:cs typeface="Barlow Condensed Medium"/>
                 <a:sym typeface="Barlow Condensed Medium"/>
               </a:rPr>
-              <a:t>08</a:t>
+              <a:t>07</a:t>
             </a:r>
           </a:p>
         </p:txBody>
@@ -8014,8 +8163,8 @@
         </p:nvSpPr>
         <p:spPr>
           <a:xfrm rot="0">
-            <a:off x="16352219" y="1367349"/>
-            <a:ext cx="371740" cy="452561"/>
+            <a:off x="16345769" y="1367349"/>
+            <a:ext cx="378189" cy="452561"/>
           </a:xfrm>
           <a:prstGeom prst="rect">
             <a:avLst/>
@@ -8042,7 +8191,7 @@
                 <a:cs typeface="Barlow Condensed Medium"/>
                 <a:sym typeface="Barlow Condensed Medium"/>
               </a:rPr>
-              <a:t>09</a:t>
+              <a:t>08</a:t>
             </a:r>
           </a:p>
         </p:txBody>
@@ -8256,8 +8405,8 @@
         </p:nvSpPr>
         <p:spPr>
           <a:xfrm flipH="false" flipV="false" rot="0">
-            <a:off x="-2123773" y="9258300"/>
-            <a:ext cx="4099837" cy="4114800"/>
+            <a:off x="4105469" y="3086100"/>
+            <a:ext cx="10077061" cy="6172200"/>
           </a:xfrm>
           <a:custGeom>
             <a:avLst/>
@@ -8266,18 +8415,18 @@
             <a:cxnLst/>
             <a:rect r="r" b="b" t="t" l="l"/>
             <a:pathLst>
-              <a:path h="4114800" w="4099837">
+              <a:path h="6172200" w="10077061">
                 <a:moveTo>
                   <a:pt x="0" y="0"/>
                 </a:moveTo>
                 <a:lnTo>
-                  <a:pt x="4099837" y="0"/>
-                </a:lnTo>
-                <a:lnTo>
-                  <a:pt x="4099837" y="4114800"/>
-                </a:lnTo>
-                <a:lnTo>
-                  <a:pt x="0" y="4114800"/>
+                  <a:pt x="10077062" y="0"/>
+                </a:lnTo>
+                <a:lnTo>
+                  <a:pt x="10077062" y="6172200"/>
+                </a:lnTo>
+                <a:lnTo>
+                  <a:pt x="0" y="6172200"/>
                 </a:lnTo>
                 <a:lnTo>
                   <a:pt x="0" y="0"/>
@@ -8287,10 +8436,56 @@
             </a:pathLst>
           </a:custGeom>
           <a:blipFill>
-            <a:blip r:embed="rId2">
+            <a:blip r:embed="rId2"/>
+            <a:stretch>
+              <a:fillRect l="0" t="0" r="0" b="0"/>
+            </a:stretch>
+          </a:blipFill>
+        </p:spPr>
+      </p:sp>
+      <p:sp>
+        <p:nvSpPr>
+          <p:cNvPr name="Freeform 6" id="6"/>
+          <p:cNvSpPr/>
+          <p:nvPr/>
+        </p:nvSpPr>
+        <p:spPr>
+          <a:xfrm flipH="true" flipV="false" rot="0">
+            <a:off x="-2478790" y="6978618"/>
+            <a:ext cx="5440240" cy="4114800"/>
+          </a:xfrm>
+          <a:custGeom>
+            <a:avLst/>
+            <a:gdLst/>
+            <a:ahLst/>
+            <a:cxnLst/>
+            <a:rect r="r" b="b" t="t" l="l"/>
+            <a:pathLst>
+              <a:path h="4114800" w="5440240">
+                <a:moveTo>
+                  <a:pt x="5440240" y="0"/>
+                </a:moveTo>
+                <a:lnTo>
+                  <a:pt x="0" y="0"/>
+                </a:lnTo>
+                <a:lnTo>
+                  <a:pt x="0" y="4114800"/>
+                </a:lnTo>
+                <a:lnTo>
+                  <a:pt x="5440240" y="4114800"/>
+                </a:lnTo>
+                <a:lnTo>
+                  <a:pt x="5440240" y="0"/>
+                </a:lnTo>
+                <a:close/>
+              </a:path>
+            </a:pathLst>
+          </a:custGeom>
+          <a:blipFill>
+            <a:blip r:embed="rId3">
               <a:extLst>
                 <a:ext uri="{96DAC541-7B7A-43D3-8B79-37D633B846F1}">
-                  <asvg:svgBlip xmlns:asvg="http://schemas.microsoft.com/office/drawing/2016/SVG/main" r:embed="rId3"/>
+                  <asvg:svgBlip xmlns:asvg="http://schemas.microsoft.com/office/drawing/2016/SVG/main" r:embed="rId4"/>
                 </a:ext>
               </a:extLst>
             </a:blip>
@@ -8302,14 +8497,14 @@
       </p:sp>
       <p:sp>
         <p:nvSpPr>
-          <p:cNvPr name="TextBox 6" id="6"/>
+          <p:cNvPr name="TextBox 7" id="7"/>
           <p:cNvSpPr txBox="true"/>
           <p:nvPr/>
         </p:nvSpPr>
         <p:spPr>
           <a:xfrm rot="0">
-            <a:off x="16416049" y="1367349"/>
-            <a:ext cx="307909" cy="452561"/>
+            <a:off x="16352219" y="1367349"/>
+            <a:ext cx="371740" cy="452561"/>
           </a:xfrm>
           <a:prstGeom prst="rect">
             <a:avLst/>
@@ -8336,255 +8531,14 @@
                 <a:cs typeface="Barlow Condensed Medium"/>
                 <a:sym typeface="Barlow Condensed Medium"/>
               </a:rPr>
-              <a:t>10</a:t>
-            </a:r>
-          </a:p>
-        </p:txBody>
-      </p:sp>
-      <p:sp>
-        <p:nvSpPr>
-          <p:cNvPr name="Freeform 7" id="7"/>
-          <p:cNvSpPr/>
-          <p:nvPr/>
-        </p:nvSpPr>
-        <p:spPr>
-          <a:xfrm flipH="false" flipV="true" rot="0">
-            <a:off x="15567880" y="-1028700"/>
-            <a:ext cx="5440240" cy="4114800"/>
-          </a:xfrm>
-          <a:custGeom>
-            <a:avLst/>
-            <a:gdLst/>
-            <a:ahLst/>
-            <a:cxnLst/>
-            <a:rect r="r" b="b" t="t" l="l"/>
-            <a:pathLst>
-              <a:path h="4114800" w="5440240">
-                <a:moveTo>
-                  <a:pt x="0" y="4114800"/>
-                </a:moveTo>
-                <a:lnTo>
-                  <a:pt x="5440240" y="4114800"/>
-                </a:lnTo>
-                <a:lnTo>
-                  <a:pt x="5440240" y="0"/>
-                </a:lnTo>
-                <a:lnTo>
-                  <a:pt x="0" y="0"/>
-                </a:lnTo>
-                <a:lnTo>
-                  <a:pt x="0" y="4114800"/>
-                </a:lnTo>
-                <a:close/>
-              </a:path>
-            </a:pathLst>
-          </a:custGeom>
-          <a:blipFill>
-            <a:blip r:embed="rId4">
-              <a:extLst>
-                <a:ext uri="{96DAC541-7B7A-43D3-8B79-37D633B846F1}">
-                  <asvg:svgBlip xmlns:asvg="http://schemas.microsoft.com/office/drawing/2016/SVG/main" r:embed="rId5"/>
-                </a:ext>
-              </a:extLst>
-            </a:blip>
-            <a:stretch>
-              <a:fillRect l="0" t="0" r="0" b="0"/>
-            </a:stretch>
-          </a:blipFill>
-        </p:spPr>
-      </p:sp>
-      <p:grpSp>
-        <p:nvGrpSpPr>
-          <p:cNvPr name="Group 8" id="8"/>
-          <p:cNvGrpSpPr/>
-          <p:nvPr/>
-        </p:nvGrpSpPr>
-        <p:grpSpPr>
-          <a:xfrm rot="0">
-            <a:off x="2015522" y="2600162"/>
-            <a:ext cx="14256955" cy="6658138"/>
-            <a:chOff x="0" y="0"/>
-            <a:chExt cx="19009274" cy="8877517"/>
-          </a:xfrm>
-        </p:grpSpPr>
-        <p:sp>
-          <p:nvSpPr>
-            <p:cNvPr name="Freeform 9" id="9"/>
-            <p:cNvSpPr/>
-            <p:nvPr/>
-          </p:nvSpPr>
-          <p:spPr>
-            <a:xfrm flipH="false" flipV="false" rot="0">
-              <a:off x="0" y="0"/>
-              <a:ext cx="9557248" cy="8877517"/>
-            </a:xfrm>
-            <a:custGeom>
-              <a:avLst/>
-              <a:gdLst/>
-              <a:ahLst/>
-              <a:cxnLst/>
-              <a:rect r="r" b="b" t="t" l="l"/>
-              <a:pathLst>
-                <a:path h="8877517" w="9557248">
-                  <a:moveTo>
-                    <a:pt x="0" y="0"/>
-                  </a:moveTo>
-                  <a:lnTo>
-                    <a:pt x="9557248" y="0"/>
-                  </a:lnTo>
-                  <a:lnTo>
-                    <a:pt x="9557248" y="8877517"/>
-                  </a:lnTo>
-                  <a:lnTo>
-                    <a:pt x="0" y="8877517"/>
-                  </a:lnTo>
-                  <a:lnTo>
-                    <a:pt x="0" y="0"/>
-                  </a:lnTo>
-                  <a:close/>
-                </a:path>
-              </a:pathLst>
-            </a:custGeom>
-            <a:blipFill>
-              <a:blip r:embed="rId6"/>
-              <a:stretch>
-                <a:fillRect l="0" t="0" r="-13663" b="0"/>
-              </a:stretch>
-            </a:blipFill>
-          </p:spPr>
-        </p:sp>
-        <p:sp>
-          <p:nvSpPr>
-            <p:cNvPr name="Freeform 10" id="10"/>
-            <p:cNvSpPr/>
-            <p:nvPr/>
-          </p:nvSpPr>
-          <p:spPr>
-            <a:xfrm flipH="false" flipV="false" rot="0">
-              <a:off x="9351975" y="0"/>
-              <a:ext cx="9657299" cy="8877517"/>
-            </a:xfrm>
-            <a:custGeom>
-              <a:avLst/>
-              <a:gdLst/>
-              <a:ahLst/>
-              <a:cxnLst/>
-              <a:rect r="r" b="b" t="t" l="l"/>
-              <a:pathLst>
-                <a:path h="8877517" w="9657299">
-                  <a:moveTo>
-                    <a:pt x="0" y="0"/>
-                  </a:moveTo>
-                  <a:lnTo>
-                    <a:pt x="9657299" y="0"/>
-                  </a:lnTo>
-                  <a:lnTo>
-                    <a:pt x="9657299" y="8877517"/>
-                  </a:lnTo>
-                  <a:lnTo>
-                    <a:pt x="0" y="8877517"/>
-                  </a:lnTo>
-                  <a:lnTo>
-                    <a:pt x="0" y="0"/>
-                  </a:lnTo>
-                  <a:close/>
-                </a:path>
-              </a:pathLst>
-            </a:custGeom>
-            <a:blipFill>
-              <a:blip r:embed="rId7"/>
-              <a:stretch>
-                <a:fillRect l="0" t="0" r="0" b="0"/>
-              </a:stretch>
-            </a:blipFill>
-          </p:spPr>
-        </p:sp>
-      </p:grpSp>
-      <p:grpSp>
-        <p:nvGrpSpPr>
-          <p:cNvPr name="Group 11" id="11"/>
-          <p:cNvGrpSpPr/>
-          <p:nvPr/>
-        </p:nvGrpSpPr>
-        <p:grpSpPr>
-          <a:xfrm rot="0">
-            <a:off x="2690336" y="2926138"/>
-            <a:ext cx="3222949" cy="117533"/>
-            <a:chOff x="0" y="0"/>
-            <a:chExt cx="848842" cy="30955"/>
-          </a:xfrm>
-        </p:grpSpPr>
-        <p:sp>
-          <p:nvSpPr>
-            <p:cNvPr name="Freeform 12" id="12"/>
-            <p:cNvSpPr/>
-            <p:nvPr/>
-          </p:nvSpPr>
-          <p:spPr>
-            <a:xfrm flipH="false" flipV="false" rot="0">
-              <a:off x="0" y="0"/>
-              <a:ext cx="848842" cy="30955"/>
-            </a:xfrm>
-            <a:custGeom>
-              <a:avLst/>
-              <a:gdLst/>
-              <a:ahLst/>
-              <a:cxnLst/>
-              <a:rect r="r" b="b" t="t" l="l"/>
-              <a:pathLst>
-                <a:path h="30955" w="848842">
-                  <a:moveTo>
-                    <a:pt x="0" y="0"/>
-                  </a:moveTo>
-                  <a:lnTo>
-                    <a:pt x="848842" y="0"/>
-                  </a:lnTo>
-                  <a:lnTo>
-                    <a:pt x="848842" y="30955"/>
-                  </a:lnTo>
-                  <a:lnTo>
-                    <a:pt x="0" y="30955"/>
-                  </a:lnTo>
-                  <a:close/>
-                </a:path>
-              </a:pathLst>
-            </a:custGeom>
-            <a:solidFill>
-              <a:srgbClr val="1F1F1F"/>
-            </a:solidFill>
-          </p:spPr>
-        </p:sp>
-        <p:sp>
-          <p:nvSpPr>
-            <p:cNvPr name="TextBox 13" id="13"/>
-            <p:cNvSpPr txBox="true"/>
-            <p:nvPr/>
-          </p:nvSpPr>
-          <p:spPr>
-            <a:xfrm>
-              <a:off x="0" y="-47625"/>
-              <a:ext cx="848842" cy="78580"/>
-            </a:xfrm>
-            <a:prstGeom prst="rect">
-              <a:avLst/>
-            </a:prstGeom>
-          </p:spPr>
-          <p:txBody>
-            <a:bodyPr anchor="ctr" rtlCol="false" tIns="50800" lIns="50800" bIns="50800" rIns="50800"/>
-            <a:lstStyle/>
-            <a:p>
-              <a:pPr algn="ctr">
-                <a:lnSpc>
-                  <a:spcPts val="3359"/>
-                </a:lnSpc>
-              </a:pPr>
-            </a:p>
-          </p:txBody>
-        </p:sp>
-      </p:grpSp>
-      <p:sp>
-        <p:nvSpPr>
-          <p:cNvPr name="TextBox 14" id="14"/>
+              <a:t>09</a:t>
+            </a:r>
+          </a:p>
+        </p:txBody>
+      </p:sp>
+      <p:sp>
+        <p:nvSpPr>
+          <p:cNvPr name="TextBox 8" id="8"/>
           <p:cNvSpPr txBox="true"/>
           <p:nvPr/>
         </p:nvSpPr>
@@ -8618,7 +8572,7 @@
                 <a:cs typeface="Barlow Condensed"/>
                 <a:sym typeface="Barlow Condensed"/>
               </a:rPr>
-              <a:t>Código Utilizado</a:t>
+              <a:t>Circuito do Projeto</a:t>
             </a:r>
           </a:p>
         </p:txBody>

</xml_diff>